<commit_message>
mahir dengan text editor
</commit_message>
<xml_diff>
--- a/Projects/FootballPlayer/Football.pptx
+++ b/Projects/FootballPlayer/Football.pptx
@@ -264,7 +264,7 @@
           <a:p>
             <a:fld id="{F6DCEFFA-62DD-4A79-99A8-6884C19A4F02}" type="datetimeFigureOut">
               <a:rPr lang="en-ID" smtClean="0"/>
-              <a:t>05/08/2024</a:t>
+              <a:t>08/08/2024</a:t>
             </a:fld>
             <a:endParaRPr lang="en-ID"/>
           </a:p>
@@ -464,7 +464,7 @@
           <a:p>
             <a:fld id="{F6DCEFFA-62DD-4A79-99A8-6884C19A4F02}" type="datetimeFigureOut">
               <a:rPr lang="en-ID" smtClean="0"/>
-              <a:t>05/08/2024</a:t>
+              <a:t>08/08/2024</a:t>
             </a:fld>
             <a:endParaRPr lang="en-ID"/>
           </a:p>
@@ -674,7 +674,7 @@
           <a:p>
             <a:fld id="{F6DCEFFA-62DD-4A79-99A8-6884C19A4F02}" type="datetimeFigureOut">
               <a:rPr lang="en-ID" smtClean="0"/>
-              <a:t>05/08/2024</a:t>
+              <a:t>08/08/2024</a:t>
             </a:fld>
             <a:endParaRPr lang="en-ID"/>
           </a:p>
@@ -874,7 +874,7 @@
           <a:p>
             <a:fld id="{F6DCEFFA-62DD-4A79-99A8-6884C19A4F02}" type="datetimeFigureOut">
               <a:rPr lang="en-ID" smtClean="0"/>
-              <a:t>05/08/2024</a:t>
+              <a:t>08/08/2024</a:t>
             </a:fld>
             <a:endParaRPr lang="en-ID"/>
           </a:p>
@@ -1150,7 +1150,7 @@
           <a:p>
             <a:fld id="{F6DCEFFA-62DD-4A79-99A8-6884C19A4F02}" type="datetimeFigureOut">
               <a:rPr lang="en-ID" smtClean="0"/>
-              <a:t>05/08/2024</a:t>
+              <a:t>08/08/2024</a:t>
             </a:fld>
             <a:endParaRPr lang="en-ID"/>
           </a:p>
@@ -1418,7 +1418,7 @@
           <a:p>
             <a:fld id="{F6DCEFFA-62DD-4A79-99A8-6884C19A4F02}" type="datetimeFigureOut">
               <a:rPr lang="en-ID" smtClean="0"/>
-              <a:t>05/08/2024</a:t>
+              <a:t>08/08/2024</a:t>
             </a:fld>
             <a:endParaRPr lang="en-ID"/>
           </a:p>
@@ -1833,7 +1833,7 @@
           <a:p>
             <a:fld id="{F6DCEFFA-62DD-4A79-99A8-6884C19A4F02}" type="datetimeFigureOut">
               <a:rPr lang="en-ID" smtClean="0"/>
-              <a:t>05/08/2024</a:t>
+              <a:t>08/08/2024</a:t>
             </a:fld>
             <a:endParaRPr lang="en-ID"/>
           </a:p>
@@ -1975,7 +1975,7 @@
           <a:p>
             <a:fld id="{F6DCEFFA-62DD-4A79-99A8-6884C19A4F02}" type="datetimeFigureOut">
               <a:rPr lang="en-ID" smtClean="0"/>
-              <a:t>05/08/2024</a:t>
+              <a:t>08/08/2024</a:t>
             </a:fld>
             <a:endParaRPr lang="en-ID"/>
           </a:p>
@@ -2088,7 +2088,7 @@
           <a:p>
             <a:fld id="{F6DCEFFA-62DD-4A79-99A8-6884C19A4F02}" type="datetimeFigureOut">
               <a:rPr lang="en-ID" smtClean="0"/>
-              <a:t>05/08/2024</a:t>
+              <a:t>08/08/2024</a:t>
             </a:fld>
             <a:endParaRPr lang="en-ID"/>
           </a:p>
@@ -2401,7 +2401,7 @@
           <a:p>
             <a:fld id="{F6DCEFFA-62DD-4A79-99A8-6884C19A4F02}" type="datetimeFigureOut">
               <a:rPr lang="en-ID" smtClean="0"/>
-              <a:t>05/08/2024</a:t>
+              <a:t>08/08/2024</a:t>
             </a:fld>
             <a:endParaRPr lang="en-ID"/>
           </a:p>
@@ -2690,7 +2690,7 @@
           <a:p>
             <a:fld id="{F6DCEFFA-62DD-4A79-99A8-6884C19A4F02}" type="datetimeFigureOut">
               <a:rPr lang="en-ID" smtClean="0"/>
-              <a:t>05/08/2024</a:t>
+              <a:t>08/08/2024</a:t>
             </a:fld>
             <a:endParaRPr lang="en-ID"/>
           </a:p>
@@ -2933,7 +2933,7 @@
           <a:p>
             <a:fld id="{F6DCEFFA-62DD-4A79-99A8-6884C19A4F02}" type="datetimeFigureOut">
               <a:rPr lang="en-ID" smtClean="0"/>
-              <a:t>05/08/2024</a:t>
+              <a:t>08/08/2024</a:t>
             </a:fld>
             <a:endParaRPr lang="en-ID"/>
           </a:p>
@@ -4367,13 +4367,13 @@
             <p:ph idx="1"/>
             <p:extLst>
               <p:ext uri="{D42A27DB-BD31-4B8C-83A1-F6EECF244321}">
-                <p14:modId xmlns:p14="http://schemas.microsoft.com/office/powerpoint/2010/main" val="1672472604"/>
+                <p14:modId xmlns:p14="http://schemas.microsoft.com/office/powerpoint/2010/main" val="1533554283"/>
               </p:ext>
             </p:extLst>
           </p:nvPr>
         </p:nvGraphicFramePr>
         <p:xfrm>
-          <a:off x="7145890" y="1537821"/>
+          <a:off x="7352437" y="1374718"/>
           <a:ext cx="4062334" cy="4389120"/>
         </p:xfrm>
         <a:graphic>
@@ -5446,7 +5446,7 @@
         </p:nvGrpSpPr>
         <p:grpSpPr>
           <a:xfrm>
-            <a:off x="2076907" y="1975723"/>
+            <a:off x="2016694" y="1976440"/>
             <a:ext cx="1391920" cy="1697217"/>
             <a:chOff x="1137920" y="1228367"/>
             <a:chExt cx="2204720" cy="2835633"/>
@@ -5770,344 +5770,6 @@
           </p:txBody>
         </p:sp>
       </p:grpSp>
-      <p:grpSp>
-        <p:nvGrpSpPr>
-          <p:cNvPr id="39" name="Group 38">
-            <a:extLst>
-              <a:ext uri="{FF2B5EF4-FFF2-40B4-BE49-F238E27FC236}">
-                <a16:creationId xmlns:a16="http://schemas.microsoft.com/office/drawing/2014/main" id="{33DB264B-596D-4326-93F1-71C700D3B7E6}"/>
-              </a:ext>
-            </a:extLst>
-          </p:cNvPr>
-          <p:cNvGrpSpPr/>
-          <p:nvPr/>
-        </p:nvGrpSpPr>
-        <p:grpSpPr>
-          <a:xfrm>
-            <a:off x="5536608" y="1975723"/>
-            <a:ext cx="1391920" cy="1697217"/>
-            <a:chOff x="1137920" y="1228368"/>
-            <a:chExt cx="2204720" cy="2835632"/>
-          </a:xfrm>
-        </p:grpSpPr>
-        <p:sp>
-          <p:nvSpPr>
-            <p:cNvPr id="40" name="Rectangle 39">
-              <a:extLst>
-                <a:ext uri="{FF2B5EF4-FFF2-40B4-BE49-F238E27FC236}">
-                  <a16:creationId xmlns:a16="http://schemas.microsoft.com/office/drawing/2014/main" id="{77FE9D7F-535A-4CDB-A90E-15B1C85AD71A}"/>
-                </a:ext>
-              </a:extLst>
-            </p:cNvPr>
-            <p:cNvSpPr/>
-            <p:nvPr/>
-          </p:nvSpPr>
-          <p:spPr>
-            <a:xfrm>
-              <a:off x="1137920" y="1229360"/>
-              <a:ext cx="2204720" cy="2834640"/>
-            </a:xfrm>
-            <a:prstGeom prst="rect">
-              <a:avLst/>
-            </a:prstGeom>
-          </p:spPr>
-          <p:style>
-            <a:lnRef idx="2">
-              <a:schemeClr val="accent1">
-                <a:shade val="50000"/>
-              </a:schemeClr>
-            </a:lnRef>
-            <a:fillRef idx="1">
-              <a:schemeClr val="accent1"/>
-            </a:fillRef>
-            <a:effectRef idx="0">
-              <a:schemeClr val="accent1"/>
-            </a:effectRef>
-            <a:fontRef idx="minor">
-              <a:schemeClr val="lt1"/>
-            </a:fontRef>
-          </p:style>
-          <p:txBody>
-            <a:bodyPr rtlCol="0" anchor="ctr"/>
-            <a:lstStyle/>
-            <a:p>
-              <a:pPr algn="ctr"/>
-              <a:endParaRPr lang="en-ID" sz="1050" dirty="0"/>
-            </a:p>
-          </p:txBody>
-        </p:sp>
-        <p:pic>
-          <p:nvPicPr>
-            <p:cNvPr id="41" name="Picture 40">
-              <a:extLst>
-                <a:ext uri="{FF2B5EF4-FFF2-40B4-BE49-F238E27FC236}">
-                  <a16:creationId xmlns:a16="http://schemas.microsoft.com/office/drawing/2014/main" id="{E69F3F08-86F4-4515-8E19-964A0AA6C5A6}"/>
-                </a:ext>
-              </a:extLst>
-            </p:cNvPr>
-            <p:cNvPicPr>
-              <a:picLocks noChangeAspect="1"/>
-            </p:cNvPicPr>
-            <p:nvPr/>
-          </p:nvPicPr>
-          <p:blipFill rotWithShape="1">
-            <a:blip r:embed="rId3">
-              <a:extLst>
-                <a:ext uri="{28A0092B-C50C-407E-A947-70E740481C1C}">
-                  <a14:useLocalDpi xmlns:a14="http://schemas.microsoft.com/office/drawing/2010/main" val="0"/>
-                </a:ext>
-              </a:extLst>
-            </a:blip>
-            <a:srcRect l="18849" r="19461"/>
-            <a:stretch/>
-          </p:blipFill>
-          <p:spPr>
-            <a:xfrm>
-              <a:off x="1371600" y="1596706"/>
-              <a:ext cx="1778000" cy="1719489"/>
-            </a:xfrm>
-            <a:prstGeom prst="rect">
-              <a:avLst/>
-            </a:prstGeom>
-          </p:spPr>
-        </p:pic>
-        <p:sp>
-          <p:nvSpPr>
-            <p:cNvPr id="42" name="TextBox 41">
-              <a:extLst>
-                <a:ext uri="{FF2B5EF4-FFF2-40B4-BE49-F238E27FC236}">
-                  <a16:creationId xmlns:a16="http://schemas.microsoft.com/office/drawing/2014/main" id="{52739F68-86BD-4055-92E5-870A3F12BA6A}"/>
-                </a:ext>
-              </a:extLst>
-            </p:cNvPr>
-            <p:cNvSpPr txBox="1"/>
-            <p:nvPr/>
-          </p:nvSpPr>
-          <p:spPr>
-            <a:xfrm>
-              <a:off x="1809603" y="1228368"/>
-              <a:ext cx="1089766" cy="437086"/>
-            </a:xfrm>
-            <a:prstGeom prst="rect">
-              <a:avLst/>
-            </a:prstGeom>
-            <a:noFill/>
-          </p:spPr>
-          <p:txBody>
-            <a:bodyPr wrap="none" rtlCol="0">
-              <a:spAutoFit/>
-            </a:bodyPr>
-            <a:lstStyle/>
-            <a:p>
-              <a:r>
-                <a:rPr lang="en-US" sz="1050" dirty="0"/>
-                <a:t>Ronaldo </a:t>
-              </a:r>
-              <a:endParaRPr lang="en-ID" sz="1050" dirty="0"/>
-            </a:p>
-          </p:txBody>
-        </p:sp>
-        <p:sp>
-          <p:nvSpPr>
-            <p:cNvPr id="43" name="Rectangle 42">
-              <a:extLst>
-                <a:ext uri="{FF2B5EF4-FFF2-40B4-BE49-F238E27FC236}">
-                  <a16:creationId xmlns:a16="http://schemas.microsoft.com/office/drawing/2014/main" id="{3B2DCA4D-FF54-4D85-B5FE-3E3833068C8F}"/>
-                </a:ext>
-              </a:extLst>
-            </p:cNvPr>
-            <p:cNvSpPr/>
-            <p:nvPr/>
-          </p:nvSpPr>
-          <p:spPr>
-            <a:xfrm>
-              <a:off x="1219200" y="3361880"/>
-              <a:ext cx="863600" cy="292911"/>
-            </a:xfrm>
-            <a:prstGeom prst="rect">
-              <a:avLst/>
-            </a:prstGeom>
-          </p:spPr>
-          <p:style>
-            <a:lnRef idx="2">
-              <a:schemeClr val="accent4">
-                <a:shade val="50000"/>
-              </a:schemeClr>
-            </a:lnRef>
-            <a:fillRef idx="1">
-              <a:schemeClr val="accent4"/>
-            </a:fillRef>
-            <a:effectRef idx="0">
-              <a:schemeClr val="accent4"/>
-            </a:effectRef>
-            <a:fontRef idx="minor">
-              <a:schemeClr val="lt1"/>
-            </a:fontRef>
-          </p:style>
-          <p:txBody>
-            <a:bodyPr rtlCol="0" anchor="ctr"/>
-            <a:lstStyle/>
-            <a:p>
-              <a:pPr algn="ctr"/>
-              <a:r>
-                <a:rPr lang="en-US" sz="1050" dirty="0"/>
-                <a:t>Post</a:t>
-              </a:r>
-              <a:endParaRPr lang="en-ID" sz="1050" dirty="0"/>
-            </a:p>
-          </p:txBody>
-        </p:sp>
-        <p:sp>
-          <p:nvSpPr>
-            <p:cNvPr id="44" name="Rectangle 43">
-              <a:extLst>
-                <a:ext uri="{FF2B5EF4-FFF2-40B4-BE49-F238E27FC236}">
-                  <a16:creationId xmlns:a16="http://schemas.microsoft.com/office/drawing/2014/main" id="{88D4898B-840B-4452-B188-6012E6F1EDF7}"/>
-                </a:ext>
-              </a:extLst>
-            </p:cNvPr>
-            <p:cNvSpPr/>
-            <p:nvPr/>
-          </p:nvSpPr>
-          <p:spPr>
-            <a:xfrm>
-              <a:off x="1219200" y="3712940"/>
-              <a:ext cx="863600" cy="292911"/>
-            </a:xfrm>
-            <a:prstGeom prst="rect">
-              <a:avLst/>
-            </a:prstGeom>
-          </p:spPr>
-          <p:style>
-            <a:lnRef idx="2">
-              <a:schemeClr val="accent4">
-                <a:shade val="50000"/>
-              </a:schemeClr>
-            </a:lnRef>
-            <a:fillRef idx="1">
-              <a:schemeClr val="accent4"/>
-            </a:fillRef>
-            <a:effectRef idx="0">
-              <a:schemeClr val="accent4"/>
-            </a:effectRef>
-            <a:fontRef idx="minor">
-              <a:schemeClr val="lt1"/>
-            </a:fontRef>
-          </p:style>
-          <p:txBody>
-            <a:bodyPr rtlCol="0" anchor="ctr"/>
-            <a:lstStyle/>
-            <a:p>
-              <a:pPr algn="ctr"/>
-              <a:r>
-                <a:rPr lang="en-US" sz="1050" dirty="0"/>
-                <a:t>Age</a:t>
-              </a:r>
-              <a:endParaRPr lang="en-ID" sz="1050" dirty="0"/>
-            </a:p>
-          </p:txBody>
-        </p:sp>
-        <p:sp>
-          <p:nvSpPr>
-            <p:cNvPr id="45" name="Rectangle 44">
-              <a:extLst>
-                <a:ext uri="{FF2B5EF4-FFF2-40B4-BE49-F238E27FC236}">
-                  <a16:creationId xmlns:a16="http://schemas.microsoft.com/office/drawing/2014/main" id="{574F2832-2A7C-4F20-8AFC-208C5EBED5E9}"/>
-                </a:ext>
-              </a:extLst>
-            </p:cNvPr>
-            <p:cNvSpPr/>
-            <p:nvPr/>
-          </p:nvSpPr>
-          <p:spPr>
-            <a:xfrm>
-              <a:off x="2207260" y="3361880"/>
-              <a:ext cx="1028700" cy="315430"/>
-            </a:xfrm>
-            <a:prstGeom prst="rect">
-              <a:avLst/>
-            </a:prstGeom>
-          </p:spPr>
-          <p:style>
-            <a:lnRef idx="2">
-              <a:schemeClr val="accent4">
-                <a:shade val="50000"/>
-              </a:schemeClr>
-            </a:lnRef>
-            <a:fillRef idx="1">
-              <a:schemeClr val="accent4"/>
-            </a:fillRef>
-            <a:effectRef idx="0">
-              <a:schemeClr val="accent4"/>
-            </a:effectRef>
-            <a:fontRef idx="minor">
-              <a:schemeClr val="lt1"/>
-            </a:fontRef>
-          </p:style>
-          <p:txBody>
-            <a:bodyPr rtlCol="0" anchor="ctr"/>
-            <a:lstStyle/>
-            <a:p>
-              <a:pPr algn="ctr"/>
-              <a:r>
-                <a:rPr lang="en-US" sz="1050" dirty="0"/>
-                <a:t>DMF/LF</a:t>
-              </a:r>
-              <a:endParaRPr lang="en-ID" sz="1050" dirty="0"/>
-            </a:p>
-          </p:txBody>
-        </p:sp>
-        <p:sp>
-          <p:nvSpPr>
-            <p:cNvPr id="46" name="Rectangle 45">
-              <a:extLst>
-                <a:ext uri="{FF2B5EF4-FFF2-40B4-BE49-F238E27FC236}">
-                  <a16:creationId xmlns:a16="http://schemas.microsoft.com/office/drawing/2014/main" id="{5A819A5B-C22D-446A-9E10-C5C5B34E5300}"/>
-                </a:ext>
-              </a:extLst>
-            </p:cNvPr>
-            <p:cNvSpPr/>
-            <p:nvPr/>
-          </p:nvSpPr>
-          <p:spPr>
-            <a:xfrm>
-              <a:off x="2192020" y="3712330"/>
-              <a:ext cx="1043940" cy="315429"/>
-            </a:xfrm>
-            <a:prstGeom prst="rect">
-              <a:avLst/>
-            </a:prstGeom>
-          </p:spPr>
-          <p:style>
-            <a:lnRef idx="2">
-              <a:schemeClr val="accent4">
-                <a:shade val="50000"/>
-              </a:schemeClr>
-            </a:lnRef>
-            <a:fillRef idx="1">
-              <a:schemeClr val="accent4"/>
-            </a:fillRef>
-            <a:effectRef idx="0">
-              <a:schemeClr val="accent4"/>
-            </a:effectRef>
-            <a:fontRef idx="minor">
-              <a:schemeClr val="lt1"/>
-            </a:fontRef>
-          </p:style>
-          <p:txBody>
-            <a:bodyPr rtlCol="0" anchor="ctr"/>
-            <a:lstStyle/>
-            <a:p>
-              <a:pPr algn="ctr"/>
-              <a:r>
-                <a:rPr lang="en-US" sz="1050" dirty="0"/>
-                <a:t>27</a:t>
-              </a:r>
-              <a:endParaRPr lang="en-ID" sz="1050" dirty="0"/>
-            </a:p>
-          </p:txBody>
-        </p:sp>
-      </p:grpSp>
       <p:sp>
         <p:nvSpPr>
           <p:cNvPr id="95" name="Rectangle: Rounded Corners 94">
@@ -6230,42 +5892,6 @@
           </a:p>
         </p:txBody>
       </p:sp>
-      <p:pic>
-        <p:nvPicPr>
-          <p:cNvPr id="101" name="Picture 100">
-            <a:extLst>
-              <a:ext uri="{FF2B5EF4-FFF2-40B4-BE49-F238E27FC236}">
-                <a16:creationId xmlns:a16="http://schemas.microsoft.com/office/drawing/2014/main" id="{A8B8F01E-C3E8-43DE-AD50-7449EC6D54D0}"/>
-              </a:ext>
-            </a:extLst>
-          </p:cNvPr>
-          <p:cNvPicPr>
-            <a:picLocks noChangeAspect="1"/>
-          </p:cNvPicPr>
-          <p:nvPr/>
-        </p:nvPicPr>
-        <p:blipFill>
-          <a:blip r:embed="rId4">
-            <a:extLst>
-              <a:ext uri="{28A0092B-C50C-407E-A947-70E740481C1C}">
-                <a14:useLocalDpi xmlns:a14="http://schemas.microsoft.com/office/drawing/2010/main" val="0"/>
-              </a:ext>
-            </a:extLst>
-          </a:blip>
-          <a:stretch>
-            <a:fillRect/>
-          </a:stretch>
-        </p:blipFill>
-        <p:spPr>
-          <a:xfrm flipH="1">
-            <a:off x="10478505" y="1537821"/>
-            <a:ext cx="2623838" cy="5995394"/>
-          </a:xfrm>
-          <a:prstGeom prst="rect">
-            <a:avLst/>
-          </a:prstGeom>
-        </p:spPr>
-      </p:pic>
       <p:sp>
         <p:nvSpPr>
           <p:cNvPr id="58" name="Rectangle 57">
@@ -6334,7 +5960,7 @@
           <p:nvPr/>
         </p:nvPicPr>
         <p:blipFill>
-          <a:blip r:embed="rId5">
+          <a:blip r:embed="rId4">
             <a:extLst>
               <a:ext uri="{28A0092B-C50C-407E-A947-70E740481C1C}">
                 <a14:useLocalDpi xmlns:a14="http://schemas.microsoft.com/office/drawing/2010/main" val="0"/>
@@ -6634,7 +6260,7 @@
         </p:nvGrpSpPr>
         <p:grpSpPr>
           <a:xfrm>
-            <a:off x="3802465" y="1976019"/>
+            <a:off x="3654897" y="1975723"/>
             <a:ext cx="1391920" cy="1697217"/>
             <a:chOff x="1137920" y="1228367"/>
             <a:chExt cx="2204720" cy="2835633"/>
@@ -6972,7 +6598,7 @@
         </p:nvGrpSpPr>
         <p:grpSpPr>
           <a:xfrm>
-            <a:off x="375920" y="3888347"/>
+            <a:off x="325026" y="3879380"/>
             <a:ext cx="1391920" cy="1697217"/>
             <a:chOff x="1137920" y="1228367"/>
             <a:chExt cx="2204720" cy="2835633"/>
@@ -7310,7 +6936,7 @@
         </p:nvGrpSpPr>
         <p:grpSpPr>
           <a:xfrm>
-            <a:off x="2076907" y="3888347"/>
+            <a:off x="2016694" y="3892373"/>
             <a:ext cx="1391920" cy="1697217"/>
             <a:chOff x="1137920" y="1228367"/>
             <a:chExt cx="2204720" cy="2835633"/>
@@ -7636,10 +7262,10 @@
       </p:grpSp>
       <p:grpSp>
         <p:nvGrpSpPr>
-          <p:cNvPr id="149" name="Group 148">
+          <p:cNvPr id="157" name="Group 156">
             <a:extLst>
               <a:ext uri="{FF2B5EF4-FFF2-40B4-BE49-F238E27FC236}">
-                <a16:creationId xmlns:a16="http://schemas.microsoft.com/office/drawing/2014/main" id="{50B5EFE5-839A-4805-B906-9FB4AC90189E}"/>
+                <a16:creationId xmlns:a16="http://schemas.microsoft.com/office/drawing/2014/main" id="{5285E802-B491-40F8-B012-0B60214AA94E}"/>
               </a:ext>
             </a:extLst>
           </p:cNvPr>
@@ -7648,345 +7274,7 @@
         </p:nvGrpSpPr>
         <p:grpSpPr>
           <a:xfrm>
-            <a:off x="5536608" y="3888347"/>
-            <a:ext cx="1391920" cy="1697217"/>
-            <a:chOff x="1137920" y="1228368"/>
-            <a:chExt cx="2204720" cy="2835632"/>
-          </a:xfrm>
-        </p:grpSpPr>
-        <p:sp>
-          <p:nvSpPr>
-            <p:cNvPr id="150" name="Rectangle 149">
-              <a:extLst>
-                <a:ext uri="{FF2B5EF4-FFF2-40B4-BE49-F238E27FC236}">
-                  <a16:creationId xmlns:a16="http://schemas.microsoft.com/office/drawing/2014/main" id="{2D9C0AA8-1216-45E9-82EE-F8C939FF205B}"/>
-                </a:ext>
-              </a:extLst>
-            </p:cNvPr>
-            <p:cNvSpPr/>
-            <p:nvPr/>
-          </p:nvSpPr>
-          <p:spPr>
-            <a:xfrm>
-              <a:off x="1137920" y="1229360"/>
-              <a:ext cx="2204720" cy="2834640"/>
-            </a:xfrm>
-            <a:prstGeom prst="rect">
-              <a:avLst/>
-            </a:prstGeom>
-          </p:spPr>
-          <p:style>
-            <a:lnRef idx="2">
-              <a:schemeClr val="accent1">
-                <a:shade val="50000"/>
-              </a:schemeClr>
-            </a:lnRef>
-            <a:fillRef idx="1">
-              <a:schemeClr val="accent1"/>
-            </a:fillRef>
-            <a:effectRef idx="0">
-              <a:schemeClr val="accent1"/>
-            </a:effectRef>
-            <a:fontRef idx="minor">
-              <a:schemeClr val="lt1"/>
-            </a:fontRef>
-          </p:style>
-          <p:txBody>
-            <a:bodyPr rtlCol="0" anchor="ctr"/>
-            <a:lstStyle/>
-            <a:p>
-              <a:pPr algn="ctr"/>
-              <a:endParaRPr lang="en-ID" sz="1050" dirty="0"/>
-            </a:p>
-          </p:txBody>
-        </p:sp>
-        <p:pic>
-          <p:nvPicPr>
-            <p:cNvPr id="151" name="Picture 150">
-              <a:extLst>
-                <a:ext uri="{FF2B5EF4-FFF2-40B4-BE49-F238E27FC236}">
-                  <a16:creationId xmlns:a16="http://schemas.microsoft.com/office/drawing/2014/main" id="{F2110AB0-F873-47EC-B042-AD1F6D8BD72E}"/>
-                </a:ext>
-              </a:extLst>
-            </p:cNvPr>
-            <p:cNvPicPr>
-              <a:picLocks noChangeAspect="1"/>
-            </p:cNvPicPr>
-            <p:nvPr/>
-          </p:nvPicPr>
-          <p:blipFill rotWithShape="1">
-            <a:blip r:embed="rId3">
-              <a:extLst>
-                <a:ext uri="{28A0092B-C50C-407E-A947-70E740481C1C}">
-                  <a14:useLocalDpi xmlns:a14="http://schemas.microsoft.com/office/drawing/2010/main" val="0"/>
-                </a:ext>
-              </a:extLst>
-            </a:blip>
-            <a:srcRect l="18849" r="19461"/>
-            <a:stretch/>
-          </p:blipFill>
-          <p:spPr>
-            <a:xfrm>
-              <a:off x="1371600" y="1596706"/>
-              <a:ext cx="1778000" cy="1719489"/>
-            </a:xfrm>
-            <a:prstGeom prst="rect">
-              <a:avLst/>
-            </a:prstGeom>
-          </p:spPr>
-        </p:pic>
-        <p:sp>
-          <p:nvSpPr>
-            <p:cNvPr id="152" name="TextBox 151">
-              <a:extLst>
-                <a:ext uri="{FF2B5EF4-FFF2-40B4-BE49-F238E27FC236}">
-                  <a16:creationId xmlns:a16="http://schemas.microsoft.com/office/drawing/2014/main" id="{B26EBEE7-8C71-46E3-BE88-8007BDD5C19E}"/>
-                </a:ext>
-              </a:extLst>
-            </p:cNvPr>
-            <p:cNvSpPr txBox="1"/>
-            <p:nvPr/>
-          </p:nvSpPr>
-          <p:spPr>
-            <a:xfrm>
-              <a:off x="1809603" y="1228368"/>
-              <a:ext cx="1089766" cy="437086"/>
-            </a:xfrm>
-            <a:prstGeom prst="rect">
-              <a:avLst/>
-            </a:prstGeom>
-            <a:noFill/>
-          </p:spPr>
-          <p:txBody>
-            <a:bodyPr wrap="none" rtlCol="0">
-              <a:spAutoFit/>
-            </a:bodyPr>
-            <a:lstStyle/>
-            <a:p>
-              <a:r>
-                <a:rPr lang="en-US" sz="1050" dirty="0"/>
-                <a:t>Ronaldo </a:t>
-              </a:r>
-              <a:endParaRPr lang="en-ID" sz="1050" dirty="0"/>
-            </a:p>
-          </p:txBody>
-        </p:sp>
-        <p:sp>
-          <p:nvSpPr>
-            <p:cNvPr id="153" name="Rectangle 152">
-              <a:extLst>
-                <a:ext uri="{FF2B5EF4-FFF2-40B4-BE49-F238E27FC236}">
-                  <a16:creationId xmlns:a16="http://schemas.microsoft.com/office/drawing/2014/main" id="{9A428F87-62E7-43D5-A877-DB2E8DDEF353}"/>
-                </a:ext>
-              </a:extLst>
-            </p:cNvPr>
-            <p:cNvSpPr/>
-            <p:nvPr/>
-          </p:nvSpPr>
-          <p:spPr>
-            <a:xfrm>
-              <a:off x="1219200" y="3361880"/>
-              <a:ext cx="863600" cy="292911"/>
-            </a:xfrm>
-            <a:prstGeom prst="rect">
-              <a:avLst/>
-            </a:prstGeom>
-          </p:spPr>
-          <p:style>
-            <a:lnRef idx="2">
-              <a:schemeClr val="accent4">
-                <a:shade val="50000"/>
-              </a:schemeClr>
-            </a:lnRef>
-            <a:fillRef idx="1">
-              <a:schemeClr val="accent4"/>
-            </a:fillRef>
-            <a:effectRef idx="0">
-              <a:schemeClr val="accent4"/>
-            </a:effectRef>
-            <a:fontRef idx="minor">
-              <a:schemeClr val="lt1"/>
-            </a:fontRef>
-          </p:style>
-          <p:txBody>
-            <a:bodyPr rtlCol="0" anchor="ctr"/>
-            <a:lstStyle/>
-            <a:p>
-              <a:pPr algn="ctr"/>
-              <a:r>
-                <a:rPr lang="en-US" sz="1050" dirty="0"/>
-                <a:t>Post</a:t>
-              </a:r>
-              <a:endParaRPr lang="en-ID" sz="1050" dirty="0"/>
-            </a:p>
-          </p:txBody>
-        </p:sp>
-        <p:sp>
-          <p:nvSpPr>
-            <p:cNvPr id="154" name="Rectangle 153">
-              <a:extLst>
-                <a:ext uri="{FF2B5EF4-FFF2-40B4-BE49-F238E27FC236}">
-                  <a16:creationId xmlns:a16="http://schemas.microsoft.com/office/drawing/2014/main" id="{59F52A51-647A-4BE6-B401-0FFC6A58ADE7}"/>
-                </a:ext>
-              </a:extLst>
-            </p:cNvPr>
-            <p:cNvSpPr/>
-            <p:nvPr/>
-          </p:nvSpPr>
-          <p:spPr>
-            <a:xfrm>
-              <a:off x="1219200" y="3712940"/>
-              <a:ext cx="863600" cy="292911"/>
-            </a:xfrm>
-            <a:prstGeom prst="rect">
-              <a:avLst/>
-            </a:prstGeom>
-          </p:spPr>
-          <p:style>
-            <a:lnRef idx="2">
-              <a:schemeClr val="accent4">
-                <a:shade val="50000"/>
-              </a:schemeClr>
-            </a:lnRef>
-            <a:fillRef idx="1">
-              <a:schemeClr val="accent4"/>
-            </a:fillRef>
-            <a:effectRef idx="0">
-              <a:schemeClr val="accent4"/>
-            </a:effectRef>
-            <a:fontRef idx="minor">
-              <a:schemeClr val="lt1"/>
-            </a:fontRef>
-          </p:style>
-          <p:txBody>
-            <a:bodyPr rtlCol="0" anchor="ctr"/>
-            <a:lstStyle/>
-            <a:p>
-              <a:pPr algn="ctr"/>
-              <a:r>
-                <a:rPr lang="en-US" sz="1050" dirty="0"/>
-                <a:t>Age</a:t>
-              </a:r>
-              <a:endParaRPr lang="en-ID" sz="1050" dirty="0"/>
-            </a:p>
-          </p:txBody>
-        </p:sp>
-        <p:sp>
-          <p:nvSpPr>
-            <p:cNvPr id="155" name="Rectangle 154">
-              <a:extLst>
-                <a:ext uri="{FF2B5EF4-FFF2-40B4-BE49-F238E27FC236}">
-                  <a16:creationId xmlns:a16="http://schemas.microsoft.com/office/drawing/2014/main" id="{D285809F-F2FD-4499-B4AF-10A73A83D2D1}"/>
-                </a:ext>
-              </a:extLst>
-            </p:cNvPr>
-            <p:cNvSpPr/>
-            <p:nvPr/>
-          </p:nvSpPr>
-          <p:spPr>
-            <a:xfrm>
-              <a:off x="2207260" y="3361880"/>
-              <a:ext cx="1028700" cy="315430"/>
-            </a:xfrm>
-            <a:prstGeom prst="rect">
-              <a:avLst/>
-            </a:prstGeom>
-          </p:spPr>
-          <p:style>
-            <a:lnRef idx="2">
-              <a:schemeClr val="accent4">
-                <a:shade val="50000"/>
-              </a:schemeClr>
-            </a:lnRef>
-            <a:fillRef idx="1">
-              <a:schemeClr val="accent4"/>
-            </a:fillRef>
-            <a:effectRef idx="0">
-              <a:schemeClr val="accent4"/>
-            </a:effectRef>
-            <a:fontRef idx="minor">
-              <a:schemeClr val="lt1"/>
-            </a:fontRef>
-          </p:style>
-          <p:txBody>
-            <a:bodyPr rtlCol="0" anchor="ctr"/>
-            <a:lstStyle/>
-            <a:p>
-              <a:pPr algn="ctr"/>
-              <a:r>
-                <a:rPr lang="en-US" sz="1050" dirty="0"/>
-                <a:t>DMF/LF</a:t>
-              </a:r>
-              <a:endParaRPr lang="en-ID" sz="1050" dirty="0"/>
-            </a:p>
-          </p:txBody>
-        </p:sp>
-        <p:sp>
-          <p:nvSpPr>
-            <p:cNvPr id="156" name="Rectangle 155">
-              <a:extLst>
-                <a:ext uri="{FF2B5EF4-FFF2-40B4-BE49-F238E27FC236}">
-                  <a16:creationId xmlns:a16="http://schemas.microsoft.com/office/drawing/2014/main" id="{985700C1-00AD-4096-9588-F1AC189BD6E8}"/>
-                </a:ext>
-              </a:extLst>
-            </p:cNvPr>
-            <p:cNvSpPr/>
-            <p:nvPr/>
-          </p:nvSpPr>
-          <p:spPr>
-            <a:xfrm>
-              <a:off x="2192020" y="3712330"/>
-              <a:ext cx="1043940" cy="315429"/>
-            </a:xfrm>
-            <a:prstGeom prst="rect">
-              <a:avLst/>
-            </a:prstGeom>
-          </p:spPr>
-          <p:style>
-            <a:lnRef idx="2">
-              <a:schemeClr val="accent4">
-                <a:shade val="50000"/>
-              </a:schemeClr>
-            </a:lnRef>
-            <a:fillRef idx="1">
-              <a:schemeClr val="accent4"/>
-            </a:fillRef>
-            <a:effectRef idx="0">
-              <a:schemeClr val="accent4"/>
-            </a:effectRef>
-            <a:fontRef idx="minor">
-              <a:schemeClr val="lt1"/>
-            </a:fontRef>
-          </p:style>
-          <p:txBody>
-            <a:bodyPr rtlCol="0" anchor="ctr"/>
-            <a:lstStyle/>
-            <a:p>
-              <a:pPr algn="ctr"/>
-              <a:r>
-                <a:rPr lang="en-US" sz="1050" dirty="0"/>
-                <a:t>27</a:t>
-              </a:r>
-              <a:endParaRPr lang="en-ID" sz="1050" dirty="0"/>
-            </a:p>
-          </p:txBody>
-        </p:sp>
-      </p:grpSp>
-      <p:grpSp>
-        <p:nvGrpSpPr>
-          <p:cNvPr id="157" name="Group 156">
-            <a:extLst>
-              <a:ext uri="{FF2B5EF4-FFF2-40B4-BE49-F238E27FC236}">
-                <a16:creationId xmlns:a16="http://schemas.microsoft.com/office/drawing/2014/main" id="{5285E802-B491-40F8-B012-0B60214AA94E}"/>
-              </a:ext>
-            </a:extLst>
-          </p:cNvPr>
-          <p:cNvGrpSpPr/>
-          <p:nvPr/>
-        </p:nvGrpSpPr>
-        <p:grpSpPr>
-          <a:xfrm>
-            <a:off x="3802465" y="3888643"/>
+            <a:off x="3654897" y="3870681"/>
             <a:ext cx="1391920" cy="1697217"/>
             <a:chOff x="1137920" y="1228367"/>
             <a:chExt cx="2204720" cy="2835633"/>
@@ -8265,6 +7553,1228 @@
               <a:extLst>
                 <a:ext uri="{FF2B5EF4-FFF2-40B4-BE49-F238E27FC236}">
                   <a16:creationId xmlns:a16="http://schemas.microsoft.com/office/drawing/2014/main" id="{D4E83AE3-45D3-4803-9B49-FC45E7C763B7}"/>
+                </a:ext>
+              </a:extLst>
+            </p:cNvPr>
+            <p:cNvSpPr/>
+            <p:nvPr/>
+          </p:nvSpPr>
+          <p:spPr>
+            <a:xfrm>
+              <a:off x="2192020" y="3712330"/>
+              <a:ext cx="1043940" cy="315429"/>
+            </a:xfrm>
+            <a:prstGeom prst="rect">
+              <a:avLst/>
+            </a:prstGeom>
+          </p:spPr>
+          <p:style>
+            <a:lnRef idx="2">
+              <a:schemeClr val="accent4">
+                <a:shade val="50000"/>
+              </a:schemeClr>
+            </a:lnRef>
+            <a:fillRef idx="1">
+              <a:schemeClr val="accent4"/>
+            </a:fillRef>
+            <a:effectRef idx="0">
+              <a:schemeClr val="accent4"/>
+            </a:effectRef>
+            <a:fontRef idx="minor">
+              <a:schemeClr val="lt1"/>
+            </a:fontRef>
+          </p:style>
+          <p:txBody>
+            <a:bodyPr rtlCol="0" anchor="ctr"/>
+            <a:lstStyle/>
+            <a:p>
+              <a:pPr algn="ctr"/>
+              <a:r>
+                <a:rPr lang="en-US" sz="1050" dirty="0"/>
+                <a:t>27</a:t>
+              </a:r>
+              <a:endParaRPr lang="en-ID" sz="1050" dirty="0"/>
+            </a:p>
+          </p:txBody>
+        </p:sp>
+      </p:grpSp>
+      <p:grpSp>
+        <p:nvGrpSpPr>
+          <p:cNvPr id="10" name="Group 9">
+            <a:extLst>
+              <a:ext uri="{FF2B5EF4-FFF2-40B4-BE49-F238E27FC236}">
+                <a16:creationId xmlns:a16="http://schemas.microsoft.com/office/drawing/2014/main" id="{7CCB2AA9-721F-4DE3-965A-64877933976C}"/>
+              </a:ext>
+            </a:extLst>
+          </p:cNvPr>
+          <p:cNvGrpSpPr/>
+          <p:nvPr/>
+        </p:nvGrpSpPr>
+        <p:grpSpPr>
+          <a:xfrm>
+            <a:off x="10939167" y="1677892"/>
+            <a:ext cx="417932" cy="4107132"/>
+            <a:chOff x="10732620" y="1840995"/>
+            <a:chExt cx="417932" cy="4107132"/>
+          </a:xfrm>
+        </p:grpSpPr>
+        <p:cxnSp>
+          <p:nvCxnSpPr>
+            <p:cNvPr id="7" name="Straight Connector 6">
+              <a:extLst>
+                <a:ext uri="{FF2B5EF4-FFF2-40B4-BE49-F238E27FC236}">
+                  <a16:creationId xmlns:a16="http://schemas.microsoft.com/office/drawing/2014/main" id="{F0A0E9E1-1685-4435-850F-4BF3AC06C97E}"/>
+                </a:ext>
+              </a:extLst>
+            </p:cNvPr>
+            <p:cNvCxnSpPr/>
+            <p:nvPr/>
+          </p:nvCxnSpPr>
+          <p:spPr>
+            <a:xfrm>
+              <a:off x="10732620" y="1912738"/>
+              <a:ext cx="0" cy="3951218"/>
+            </a:xfrm>
+            <a:prstGeom prst="line">
+              <a:avLst/>
+            </a:prstGeom>
+            <a:ln w="19050">
+              <a:solidFill>
+                <a:schemeClr val="bg1"/>
+              </a:solidFill>
+            </a:ln>
+          </p:spPr>
+          <p:style>
+            <a:lnRef idx="1">
+              <a:schemeClr val="accent1"/>
+            </a:lnRef>
+            <a:fillRef idx="0">
+              <a:schemeClr val="accent1"/>
+            </a:fillRef>
+            <a:effectRef idx="0">
+              <a:schemeClr val="accent1"/>
+            </a:effectRef>
+            <a:fontRef idx="minor">
+              <a:schemeClr val="tx1"/>
+            </a:fontRef>
+          </p:style>
+        </p:cxnSp>
+        <p:sp>
+          <p:nvSpPr>
+            <p:cNvPr id="9" name="TextBox 8">
+              <a:extLst>
+                <a:ext uri="{FF2B5EF4-FFF2-40B4-BE49-F238E27FC236}">
+                  <a16:creationId xmlns:a16="http://schemas.microsoft.com/office/drawing/2014/main" id="{5F5BBABC-8A87-4E45-8213-A92D4A3DA34C}"/>
+                </a:ext>
+              </a:extLst>
+            </p:cNvPr>
+            <p:cNvSpPr txBox="1"/>
+            <p:nvPr/>
+          </p:nvSpPr>
+          <p:spPr>
+            <a:xfrm>
+              <a:off x="10805586" y="1840995"/>
+              <a:ext cx="344966" cy="461665"/>
+            </a:xfrm>
+            <a:prstGeom prst="rect">
+              <a:avLst/>
+            </a:prstGeom>
+            <a:noFill/>
+          </p:spPr>
+          <p:txBody>
+            <a:bodyPr wrap="none" rtlCol="0">
+              <a:spAutoFit/>
+            </a:bodyPr>
+            <a:lstStyle/>
+            <a:p>
+              <a:r>
+                <a:rPr lang="en-US" sz="2400" dirty="0">
+                  <a:solidFill>
+                    <a:srgbClr val="FF0000"/>
+                  </a:solidFill>
+                </a:rPr>
+                <a:t>X</a:t>
+              </a:r>
+              <a:endParaRPr lang="en-ID" sz="2400" dirty="0">
+                <a:solidFill>
+                  <a:srgbClr val="FF0000"/>
+                </a:solidFill>
+              </a:endParaRPr>
+            </a:p>
+          </p:txBody>
+        </p:sp>
+        <p:sp>
+          <p:nvSpPr>
+            <p:cNvPr id="83" name="TextBox 82">
+              <a:extLst>
+                <a:ext uri="{FF2B5EF4-FFF2-40B4-BE49-F238E27FC236}">
+                  <a16:creationId xmlns:a16="http://schemas.microsoft.com/office/drawing/2014/main" id="{02A640AB-3B4C-44A3-87A2-E29D9820E73A}"/>
+                </a:ext>
+              </a:extLst>
+            </p:cNvPr>
+            <p:cNvSpPr txBox="1"/>
+            <p:nvPr/>
+          </p:nvSpPr>
+          <p:spPr>
+            <a:xfrm>
+              <a:off x="10802712" y="2226298"/>
+              <a:ext cx="344966" cy="461665"/>
+            </a:xfrm>
+            <a:prstGeom prst="rect">
+              <a:avLst/>
+            </a:prstGeom>
+            <a:noFill/>
+          </p:spPr>
+          <p:txBody>
+            <a:bodyPr wrap="square" rtlCol="0">
+              <a:spAutoFit/>
+            </a:bodyPr>
+            <a:lstStyle/>
+            <a:p>
+              <a:r>
+                <a:rPr lang="en-US" sz="2400" dirty="0">
+                  <a:solidFill>
+                    <a:srgbClr val="FF0000"/>
+                  </a:solidFill>
+                </a:rPr>
+                <a:t>X</a:t>
+              </a:r>
+              <a:endParaRPr lang="en-ID" sz="2400" dirty="0">
+                <a:solidFill>
+                  <a:srgbClr val="FF0000"/>
+                </a:solidFill>
+              </a:endParaRPr>
+            </a:p>
+          </p:txBody>
+        </p:sp>
+        <p:sp>
+          <p:nvSpPr>
+            <p:cNvPr id="102" name="TextBox 101">
+              <a:extLst>
+                <a:ext uri="{FF2B5EF4-FFF2-40B4-BE49-F238E27FC236}">
+                  <a16:creationId xmlns:a16="http://schemas.microsoft.com/office/drawing/2014/main" id="{83AB2F74-098B-4AF8-90C7-5341330673FF}"/>
+                </a:ext>
+              </a:extLst>
+            </p:cNvPr>
+            <p:cNvSpPr txBox="1"/>
+            <p:nvPr/>
+          </p:nvSpPr>
+          <p:spPr>
+            <a:xfrm>
+              <a:off x="10805586" y="2615486"/>
+              <a:ext cx="344966" cy="461665"/>
+            </a:xfrm>
+            <a:prstGeom prst="rect">
+              <a:avLst/>
+            </a:prstGeom>
+            <a:noFill/>
+          </p:spPr>
+          <p:txBody>
+            <a:bodyPr wrap="none" rtlCol="0">
+              <a:spAutoFit/>
+            </a:bodyPr>
+            <a:lstStyle/>
+            <a:p>
+              <a:r>
+                <a:rPr lang="en-US" sz="2400" dirty="0">
+                  <a:solidFill>
+                    <a:srgbClr val="FF0000"/>
+                  </a:solidFill>
+                </a:rPr>
+                <a:t>X</a:t>
+              </a:r>
+              <a:endParaRPr lang="en-ID" sz="2400" dirty="0">
+                <a:solidFill>
+                  <a:srgbClr val="FF0000"/>
+                </a:solidFill>
+              </a:endParaRPr>
+            </a:p>
+          </p:txBody>
+        </p:sp>
+        <p:sp>
+          <p:nvSpPr>
+            <p:cNvPr id="103" name="TextBox 102">
+              <a:extLst>
+                <a:ext uri="{FF2B5EF4-FFF2-40B4-BE49-F238E27FC236}">
+                  <a16:creationId xmlns:a16="http://schemas.microsoft.com/office/drawing/2014/main" id="{BB70370E-F098-4E7F-922B-8624189741DF}"/>
+                </a:ext>
+              </a:extLst>
+            </p:cNvPr>
+            <p:cNvSpPr txBox="1"/>
+            <p:nvPr/>
+          </p:nvSpPr>
+          <p:spPr>
+            <a:xfrm>
+              <a:off x="10802712" y="3000789"/>
+              <a:ext cx="344966" cy="461665"/>
+            </a:xfrm>
+            <a:prstGeom prst="rect">
+              <a:avLst/>
+            </a:prstGeom>
+            <a:noFill/>
+          </p:spPr>
+          <p:txBody>
+            <a:bodyPr wrap="square" rtlCol="0">
+              <a:spAutoFit/>
+            </a:bodyPr>
+            <a:lstStyle/>
+            <a:p>
+              <a:r>
+                <a:rPr lang="en-US" sz="2400" dirty="0">
+                  <a:solidFill>
+                    <a:srgbClr val="FF0000"/>
+                  </a:solidFill>
+                </a:rPr>
+                <a:t>X</a:t>
+              </a:r>
+              <a:endParaRPr lang="en-ID" sz="2400" dirty="0">
+                <a:solidFill>
+                  <a:srgbClr val="FF0000"/>
+                </a:solidFill>
+              </a:endParaRPr>
+            </a:p>
+          </p:txBody>
+        </p:sp>
+        <p:sp>
+          <p:nvSpPr>
+            <p:cNvPr id="104" name="TextBox 103">
+              <a:extLst>
+                <a:ext uri="{FF2B5EF4-FFF2-40B4-BE49-F238E27FC236}">
+                  <a16:creationId xmlns:a16="http://schemas.microsoft.com/office/drawing/2014/main" id="{28349FE1-C510-4B7D-B660-9D0C6D638727}"/>
+                </a:ext>
+              </a:extLst>
+            </p:cNvPr>
+            <p:cNvSpPr txBox="1"/>
+            <p:nvPr/>
+          </p:nvSpPr>
+          <p:spPr>
+            <a:xfrm>
+              <a:off x="10803320" y="3304071"/>
+              <a:ext cx="344966" cy="461665"/>
+            </a:xfrm>
+            <a:prstGeom prst="rect">
+              <a:avLst/>
+            </a:prstGeom>
+            <a:noFill/>
+          </p:spPr>
+          <p:txBody>
+            <a:bodyPr wrap="none" rtlCol="0">
+              <a:spAutoFit/>
+            </a:bodyPr>
+            <a:lstStyle/>
+            <a:p>
+              <a:r>
+                <a:rPr lang="en-US" sz="2400" dirty="0">
+                  <a:solidFill>
+                    <a:srgbClr val="FF0000"/>
+                  </a:solidFill>
+                </a:rPr>
+                <a:t>X</a:t>
+              </a:r>
+              <a:endParaRPr lang="en-ID" sz="2400" dirty="0">
+                <a:solidFill>
+                  <a:srgbClr val="FF0000"/>
+                </a:solidFill>
+              </a:endParaRPr>
+            </a:p>
+          </p:txBody>
+        </p:sp>
+        <p:sp>
+          <p:nvSpPr>
+            <p:cNvPr id="105" name="TextBox 104">
+              <a:extLst>
+                <a:ext uri="{FF2B5EF4-FFF2-40B4-BE49-F238E27FC236}">
+                  <a16:creationId xmlns:a16="http://schemas.microsoft.com/office/drawing/2014/main" id="{C9E09BEE-B0C6-44DA-9370-6B6143847DF9}"/>
+                </a:ext>
+              </a:extLst>
+            </p:cNvPr>
+            <p:cNvSpPr txBox="1"/>
+            <p:nvPr/>
+          </p:nvSpPr>
+          <p:spPr>
+            <a:xfrm>
+              <a:off x="10800446" y="3689374"/>
+              <a:ext cx="344966" cy="461665"/>
+            </a:xfrm>
+            <a:prstGeom prst="rect">
+              <a:avLst/>
+            </a:prstGeom>
+            <a:noFill/>
+          </p:spPr>
+          <p:txBody>
+            <a:bodyPr wrap="square" rtlCol="0">
+              <a:spAutoFit/>
+            </a:bodyPr>
+            <a:lstStyle/>
+            <a:p>
+              <a:r>
+                <a:rPr lang="en-US" sz="2400" dirty="0">
+                  <a:solidFill>
+                    <a:srgbClr val="FF0000"/>
+                  </a:solidFill>
+                </a:rPr>
+                <a:t>X</a:t>
+              </a:r>
+              <a:endParaRPr lang="en-ID" sz="2400" dirty="0">
+                <a:solidFill>
+                  <a:srgbClr val="FF0000"/>
+                </a:solidFill>
+              </a:endParaRPr>
+            </a:p>
+          </p:txBody>
+        </p:sp>
+        <p:sp>
+          <p:nvSpPr>
+            <p:cNvPr id="106" name="TextBox 105">
+              <a:extLst>
+                <a:ext uri="{FF2B5EF4-FFF2-40B4-BE49-F238E27FC236}">
+                  <a16:creationId xmlns:a16="http://schemas.microsoft.com/office/drawing/2014/main" id="{AC08A2BE-A7CD-4462-B0CA-9E84A9247F3F}"/>
+                </a:ext>
+              </a:extLst>
+            </p:cNvPr>
+            <p:cNvSpPr txBox="1"/>
+            <p:nvPr/>
+          </p:nvSpPr>
+          <p:spPr>
+            <a:xfrm>
+              <a:off x="10800446" y="4037314"/>
+              <a:ext cx="344966" cy="461665"/>
+            </a:xfrm>
+            <a:prstGeom prst="rect">
+              <a:avLst/>
+            </a:prstGeom>
+            <a:noFill/>
+          </p:spPr>
+          <p:txBody>
+            <a:bodyPr wrap="none" rtlCol="0">
+              <a:spAutoFit/>
+            </a:bodyPr>
+            <a:lstStyle/>
+            <a:p>
+              <a:r>
+                <a:rPr lang="en-US" sz="2400" dirty="0">
+                  <a:solidFill>
+                    <a:srgbClr val="FF0000"/>
+                  </a:solidFill>
+                </a:rPr>
+                <a:t>X</a:t>
+              </a:r>
+              <a:endParaRPr lang="en-ID" sz="2400" dirty="0">
+                <a:solidFill>
+                  <a:srgbClr val="FF0000"/>
+                </a:solidFill>
+              </a:endParaRPr>
+            </a:p>
+          </p:txBody>
+        </p:sp>
+        <p:sp>
+          <p:nvSpPr>
+            <p:cNvPr id="107" name="TextBox 106">
+              <a:extLst>
+                <a:ext uri="{FF2B5EF4-FFF2-40B4-BE49-F238E27FC236}">
+                  <a16:creationId xmlns:a16="http://schemas.microsoft.com/office/drawing/2014/main" id="{8197DAD7-6559-4537-8A4B-7A08E0E5C844}"/>
+                </a:ext>
+              </a:extLst>
+            </p:cNvPr>
+            <p:cNvSpPr txBox="1"/>
+            <p:nvPr/>
+          </p:nvSpPr>
+          <p:spPr>
+            <a:xfrm>
+              <a:off x="10797572" y="4422617"/>
+              <a:ext cx="344966" cy="461665"/>
+            </a:xfrm>
+            <a:prstGeom prst="rect">
+              <a:avLst/>
+            </a:prstGeom>
+            <a:noFill/>
+          </p:spPr>
+          <p:txBody>
+            <a:bodyPr wrap="square" rtlCol="0">
+              <a:spAutoFit/>
+            </a:bodyPr>
+            <a:lstStyle/>
+            <a:p>
+              <a:r>
+                <a:rPr lang="en-US" sz="2400" dirty="0">
+                  <a:solidFill>
+                    <a:srgbClr val="FF0000"/>
+                  </a:solidFill>
+                </a:rPr>
+                <a:t>X</a:t>
+              </a:r>
+              <a:endParaRPr lang="en-ID" sz="2400" dirty="0">
+                <a:solidFill>
+                  <a:srgbClr val="FF0000"/>
+                </a:solidFill>
+              </a:endParaRPr>
+            </a:p>
+          </p:txBody>
+        </p:sp>
+        <p:sp>
+          <p:nvSpPr>
+            <p:cNvPr id="108" name="TextBox 107">
+              <a:extLst>
+                <a:ext uri="{FF2B5EF4-FFF2-40B4-BE49-F238E27FC236}">
+                  <a16:creationId xmlns:a16="http://schemas.microsoft.com/office/drawing/2014/main" id="{274B7014-E638-4A29-BA8C-52A5C1797CCB}"/>
+                </a:ext>
+              </a:extLst>
+            </p:cNvPr>
+            <p:cNvSpPr txBox="1"/>
+            <p:nvPr/>
+          </p:nvSpPr>
+          <p:spPr>
+            <a:xfrm>
+              <a:off x="10802712" y="4770557"/>
+              <a:ext cx="344966" cy="461665"/>
+            </a:xfrm>
+            <a:prstGeom prst="rect">
+              <a:avLst/>
+            </a:prstGeom>
+            <a:noFill/>
+          </p:spPr>
+          <p:txBody>
+            <a:bodyPr wrap="none" rtlCol="0">
+              <a:spAutoFit/>
+            </a:bodyPr>
+            <a:lstStyle/>
+            <a:p>
+              <a:r>
+                <a:rPr lang="en-US" sz="2400" dirty="0">
+                  <a:solidFill>
+                    <a:srgbClr val="FF0000"/>
+                  </a:solidFill>
+                </a:rPr>
+                <a:t>X</a:t>
+              </a:r>
+              <a:endParaRPr lang="en-ID" sz="2400" dirty="0">
+                <a:solidFill>
+                  <a:srgbClr val="FF0000"/>
+                </a:solidFill>
+              </a:endParaRPr>
+            </a:p>
+          </p:txBody>
+        </p:sp>
+        <p:sp>
+          <p:nvSpPr>
+            <p:cNvPr id="109" name="TextBox 108">
+              <a:extLst>
+                <a:ext uri="{FF2B5EF4-FFF2-40B4-BE49-F238E27FC236}">
+                  <a16:creationId xmlns:a16="http://schemas.microsoft.com/office/drawing/2014/main" id="{C3F190BD-B750-4825-9497-8E9DAB5E3DD8}"/>
+                </a:ext>
+              </a:extLst>
+            </p:cNvPr>
+            <p:cNvSpPr txBox="1"/>
+            <p:nvPr/>
+          </p:nvSpPr>
+          <p:spPr>
+            <a:xfrm>
+              <a:off x="10799838" y="5155860"/>
+              <a:ext cx="344966" cy="461665"/>
+            </a:xfrm>
+            <a:prstGeom prst="rect">
+              <a:avLst/>
+            </a:prstGeom>
+            <a:noFill/>
+          </p:spPr>
+          <p:txBody>
+            <a:bodyPr wrap="square" rtlCol="0">
+              <a:spAutoFit/>
+            </a:bodyPr>
+            <a:lstStyle/>
+            <a:p>
+              <a:r>
+                <a:rPr lang="en-US" sz="2400" dirty="0">
+                  <a:solidFill>
+                    <a:srgbClr val="FF0000"/>
+                  </a:solidFill>
+                </a:rPr>
+                <a:t>X</a:t>
+              </a:r>
+              <a:endParaRPr lang="en-ID" sz="2400" dirty="0">
+                <a:solidFill>
+                  <a:srgbClr val="FF0000"/>
+                </a:solidFill>
+              </a:endParaRPr>
+            </a:p>
+          </p:txBody>
+        </p:sp>
+        <p:sp>
+          <p:nvSpPr>
+            <p:cNvPr id="110" name="TextBox 109">
+              <a:extLst>
+                <a:ext uri="{FF2B5EF4-FFF2-40B4-BE49-F238E27FC236}">
+                  <a16:creationId xmlns:a16="http://schemas.microsoft.com/office/drawing/2014/main" id="{3F8CD2D8-E1A8-4C20-95B4-B6A4069234E1}"/>
+                </a:ext>
+              </a:extLst>
+            </p:cNvPr>
+            <p:cNvSpPr txBox="1"/>
+            <p:nvPr/>
+          </p:nvSpPr>
+          <p:spPr>
+            <a:xfrm>
+              <a:off x="10802712" y="5486462"/>
+              <a:ext cx="344966" cy="461665"/>
+            </a:xfrm>
+            <a:prstGeom prst="rect">
+              <a:avLst/>
+            </a:prstGeom>
+            <a:noFill/>
+          </p:spPr>
+          <p:txBody>
+            <a:bodyPr wrap="none" rtlCol="0">
+              <a:spAutoFit/>
+            </a:bodyPr>
+            <a:lstStyle/>
+            <a:p>
+              <a:r>
+                <a:rPr lang="en-US" sz="2400" dirty="0">
+                  <a:solidFill>
+                    <a:srgbClr val="FF0000"/>
+                  </a:solidFill>
+                </a:rPr>
+                <a:t>X</a:t>
+              </a:r>
+              <a:endParaRPr lang="en-ID" sz="2400" dirty="0">
+                <a:solidFill>
+                  <a:srgbClr val="FF0000"/>
+                </a:solidFill>
+              </a:endParaRPr>
+            </a:p>
+          </p:txBody>
+        </p:sp>
+      </p:grpSp>
+      <p:grpSp>
+        <p:nvGrpSpPr>
+          <p:cNvPr id="112" name="Group 111">
+            <a:extLst>
+              <a:ext uri="{FF2B5EF4-FFF2-40B4-BE49-F238E27FC236}">
+                <a16:creationId xmlns:a16="http://schemas.microsoft.com/office/drawing/2014/main" id="{43465168-FD47-4E16-82F7-09DC568BD139}"/>
+              </a:ext>
+            </a:extLst>
+          </p:cNvPr>
+          <p:cNvGrpSpPr/>
+          <p:nvPr/>
+        </p:nvGrpSpPr>
+        <p:grpSpPr>
+          <a:xfrm>
+            <a:off x="5266450" y="1968049"/>
+            <a:ext cx="1391920" cy="1697217"/>
+            <a:chOff x="1137920" y="1228367"/>
+            <a:chExt cx="2204720" cy="2835633"/>
+          </a:xfrm>
+        </p:grpSpPr>
+        <p:sp>
+          <p:nvSpPr>
+            <p:cNvPr id="113" name="Rectangle 112">
+              <a:extLst>
+                <a:ext uri="{FF2B5EF4-FFF2-40B4-BE49-F238E27FC236}">
+                  <a16:creationId xmlns:a16="http://schemas.microsoft.com/office/drawing/2014/main" id="{11D699CD-D04A-4462-A5E7-20A76B5E7C32}"/>
+                </a:ext>
+              </a:extLst>
+            </p:cNvPr>
+            <p:cNvSpPr/>
+            <p:nvPr/>
+          </p:nvSpPr>
+          <p:spPr>
+            <a:xfrm>
+              <a:off x="1137920" y="1229360"/>
+              <a:ext cx="2204720" cy="2834640"/>
+            </a:xfrm>
+            <a:prstGeom prst="rect">
+              <a:avLst/>
+            </a:prstGeom>
+          </p:spPr>
+          <p:style>
+            <a:lnRef idx="2">
+              <a:schemeClr val="accent1">
+                <a:shade val="50000"/>
+              </a:schemeClr>
+            </a:lnRef>
+            <a:fillRef idx="1">
+              <a:schemeClr val="accent1"/>
+            </a:fillRef>
+            <a:effectRef idx="0">
+              <a:schemeClr val="accent1"/>
+            </a:effectRef>
+            <a:fontRef idx="minor">
+              <a:schemeClr val="lt1"/>
+            </a:fontRef>
+          </p:style>
+          <p:txBody>
+            <a:bodyPr rtlCol="0" anchor="ctr"/>
+            <a:lstStyle/>
+            <a:p>
+              <a:pPr algn="ctr"/>
+              <a:endParaRPr lang="en-ID" sz="1050" dirty="0"/>
+            </a:p>
+          </p:txBody>
+        </p:sp>
+        <p:pic>
+          <p:nvPicPr>
+            <p:cNvPr id="114" name="Picture 113">
+              <a:extLst>
+                <a:ext uri="{FF2B5EF4-FFF2-40B4-BE49-F238E27FC236}">
+                  <a16:creationId xmlns:a16="http://schemas.microsoft.com/office/drawing/2014/main" id="{C9408D93-8AA0-4D88-9B8B-A636A2AA9185}"/>
+                </a:ext>
+              </a:extLst>
+            </p:cNvPr>
+            <p:cNvPicPr>
+              <a:picLocks noChangeAspect="1"/>
+            </p:cNvPicPr>
+            <p:nvPr/>
+          </p:nvPicPr>
+          <p:blipFill rotWithShape="1">
+            <a:blip r:embed="rId3">
+              <a:extLst>
+                <a:ext uri="{28A0092B-C50C-407E-A947-70E740481C1C}">
+                  <a14:useLocalDpi xmlns:a14="http://schemas.microsoft.com/office/drawing/2010/main" val="0"/>
+                </a:ext>
+              </a:extLst>
+            </a:blip>
+            <a:srcRect l="18849" r="19461"/>
+            <a:stretch/>
+          </p:blipFill>
+          <p:spPr>
+            <a:xfrm>
+              <a:off x="1371600" y="1596706"/>
+              <a:ext cx="1778000" cy="1719489"/>
+            </a:xfrm>
+            <a:prstGeom prst="rect">
+              <a:avLst/>
+            </a:prstGeom>
+          </p:spPr>
+        </p:pic>
+        <p:sp>
+          <p:nvSpPr>
+            <p:cNvPr id="115" name="TextBox 114">
+              <a:extLst>
+                <a:ext uri="{FF2B5EF4-FFF2-40B4-BE49-F238E27FC236}">
+                  <a16:creationId xmlns:a16="http://schemas.microsoft.com/office/drawing/2014/main" id="{3F6D24BB-7058-4DBE-A871-3DE655E900A6}"/>
+                </a:ext>
+              </a:extLst>
+            </p:cNvPr>
+            <p:cNvSpPr txBox="1"/>
+            <p:nvPr/>
+          </p:nvSpPr>
+          <p:spPr>
+            <a:xfrm>
+              <a:off x="1809603" y="1228367"/>
+              <a:ext cx="1089766" cy="437086"/>
+            </a:xfrm>
+            <a:prstGeom prst="rect">
+              <a:avLst/>
+            </a:prstGeom>
+            <a:noFill/>
+          </p:spPr>
+          <p:txBody>
+            <a:bodyPr wrap="none" rtlCol="0">
+              <a:spAutoFit/>
+            </a:bodyPr>
+            <a:lstStyle/>
+            <a:p>
+              <a:r>
+                <a:rPr lang="en-US" sz="1050" dirty="0"/>
+                <a:t>Ronaldo </a:t>
+              </a:r>
+              <a:endParaRPr lang="en-ID" sz="1050" dirty="0"/>
+            </a:p>
+          </p:txBody>
+        </p:sp>
+        <p:sp>
+          <p:nvSpPr>
+            <p:cNvPr id="116" name="Rectangle 115">
+              <a:extLst>
+                <a:ext uri="{FF2B5EF4-FFF2-40B4-BE49-F238E27FC236}">
+                  <a16:creationId xmlns:a16="http://schemas.microsoft.com/office/drawing/2014/main" id="{1C62016F-244F-4C0C-A1FE-5EA8D0D8F381}"/>
+                </a:ext>
+              </a:extLst>
+            </p:cNvPr>
+            <p:cNvSpPr/>
+            <p:nvPr/>
+          </p:nvSpPr>
+          <p:spPr>
+            <a:xfrm>
+              <a:off x="1219200" y="3361880"/>
+              <a:ext cx="863600" cy="292911"/>
+            </a:xfrm>
+            <a:prstGeom prst="rect">
+              <a:avLst/>
+            </a:prstGeom>
+          </p:spPr>
+          <p:style>
+            <a:lnRef idx="2">
+              <a:schemeClr val="accent4">
+                <a:shade val="50000"/>
+              </a:schemeClr>
+            </a:lnRef>
+            <a:fillRef idx="1">
+              <a:schemeClr val="accent4"/>
+            </a:fillRef>
+            <a:effectRef idx="0">
+              <a:schemeClr val="accent4"/>
+            </a:effectRef>
+            <a:fontRef idx="minor">
+              <a:schemeClr val="lt1"/>
+            </a:fontRef>
+          </p:style>
+          <p:txBody>
+            <a:bodyPr rtlCol="0" anchor="ctr"/>
+            <a:lstStyle/>
+            <a:p>
+              <a:pPr algn="ctr"/>
+              <a:r>
+                <a:rPr lang="en-US" sz="1050" dirty="0"/>
+                <a:t>Post</a:t>
+              </a:r>
+              <a:endParaRPr lang="en-ID" sz="1050" dirty="0"/>
+            </a:p>
+          </p:txBody>
+        </p:sp>
+        <p:sp>
+          <p:nvSpPr>
+            <p:cNvPr id="117" name="Rectangle 116">
+              <a:extLst>
+                <a:ext uri="{FF2B5EF4-FFF2-40B4-BE49-F238E27FC236}">
+                  <a16:creationId xmlns:a16="http://schemas.microsoft.com/office/drawing/2014/main" id="{0851B812-9798-4012-9CED-B24A38E9382E}"/>
+                </a:ext>
+              </a:extLst>
+            </p:cNvPr>
+            <p:cNvSpPr/>
+            <p:nvPr/>
+          </p:nvSpPr>
+          <p:spPr>
+            <a:xfrm>
+              <a:off x="1219200" y="3712940"/>
+              <a:ext cx="863600" cy="292911"/>
+            </a:xfrm>
+            <a:prstGeom prst="rect">
+              <a:avLst/>
+            </a:prstGeom>
+          </p:spPr>
+          <p:style>
+            <a:lnRef idx="2">
+              <a:schemeClr val="accent4">
+                <a:shade val="50000"/>
+              </a:schemeClr>
+            </a:lnRef>
+            <a:fillRef idx="1">
+              <a:schemeClr val="accent4"/>
+            </a:fillRef>
+            <a:effectRef idx="0">
+              <a:schemeClr val="accent4"/>
+            </a:effectRef>
+            <a:fontRef idx="minor">
+              <a:schemeClr val="lt1"/>
+            </a:fontRef>
+          </p:style>
+          <p:txBody>
+            <a:bodyPr rtlCol="0" anchor="ctr"/>
+            <a:lstStyle/>
+            <a:p>
+              <a:pPr algn="ctr"/>
+              <a:r>
+                <a:rPr lang="en-US" sz="1050" dirty="0"/>
+                <a:t>Age</a:t>
+              </a:r>
+              <a:endParaRPr lang="en-ID" sz="1050" dirty="0"/>
+            </a:p>
+          </p:txBody>
+        </p:sp>
+        <p:sp>
+          <p:nvSpPr>
+            <p:cNvPr id="118" name="Rectangle 117">
+              <a:extLst>
+                <a:ext uri="{FF2B5EF4-FFF2-40B4-BE49-F238E27FC236}">
+                  <a16:creationId xmlns:a16="http://schemas.microsoft.com/office/drawing/2014/main" id="{FFD5E762-8B63-48FB-B44C-D3E80FD24BB9}"/>
+                </a:ext>
+              </a:extLst>
+            </p:cNvPr>
+            <p:cNvSpPr/>
+            <p:nvPr/>
+          </p:nvSpPr>
+          <p:spPr>
+            <a:xfrm>
+              <a:off x="2207260" y="3361880"/>
+              <a:ext cx="1028700" cy="315430"/>
+            </a:xfrm>
+            <a:prstGeom prst="rect">
+              <a:avLst/>
+            </a:prstGeom>
+          </p:spPr>
+          <p:style>
+            <a:lnRef idx="2">
+              <a:schemeClr val="accent4">
+                <a:shade val="50000"/>
+              </a:schemeClr>
+            </a:lnRef>
+            <a:fillRef idx="1">
+              <a:schemeClr val="accent4"/>
+            </a:fillRef>
+            <a:effectRef idx="0">
+              <a:schemeClr val="accent4"/>
+            </a:effectRef>
+            <a:fontRef idx="minor">
+              <a:schemeClr val="lt1"/>
+            </a:fontRef>
+          </p:style>
+          <p:txBody>
+            <a:bodyPr rtlCol="0" anchor="ctr"/>
+            <a:lstStyle/>
+            <a:p>
+              <a:pPr algn="ctr"/>
+              <a:r>
+                <a:rPr lang="en-US" sz="1050" dirty="0"/>
+                <a:t>DMF/LF</a:t>
+              </a:r>
+              <a:endParaRPr lang="en-ID" sz="1050" dirty="0"/>
+            </a:p>
+          </p:txBody>
+        </p:sp>
+        <p:sp>
+          <p:nvSpPr>
+            <p:cNvPr id="119" name="Rectangle 118">
+              <a:extLst>
+                <a:ext uri="{FF2B5EF4-FFF2-40B4-BE49-F238E27FC236}">
+                  <a16:creationId xmlns:a16="http://schemas.microsoft.com/office/drawing/2014/main" id="{A974EE22-A7E3-40DE-AC9C-2334CC7790AE}"/>
+                </a:ext>
+              </a:extLst>
+            </p:cNvPr>
+            <p:cNvSpPr/>
+            <p:nvPr/>
+          </p:nvSpPr>
+          <p:spPr>
+            <a:xfrm>
+              <a:off x="2192020" y="3712330"/>
+              <a:ext cx="1043940" cy="315429"/>
+            </a:xfrm>
+            <a:prstGeom prst="rect">
+              <a:avLst/>
+            </a:prstGeom>
+          </p:spPr>
+          <p:style>
+            <a:lnRef idx="2">
+              <a:schemeClr val="accent4">
+                <a:shade val="50000"/>
+              </a:schemeClr>
+            </a:lnRef>
+            <a:fillRef idx="1">
+              <a:schemeClr val="accent4"/>
+            </a:fillRef>
+            <a:effectRef idx="0">
+              <a:schemeClr val="accent4"/>
+            </a:effectRef>
+            <a:fontRef idx="minor">
+              <a:schemeClr val="lt1"/>
+            </a:fontRef>
+          </p:style>
+          <p:txBody>
+            <a:bodyPr rtlCol="0" anchor="ctr"/>
+            <a:lstStyle/>
+            <a:p>
+              <a:pPr algn="ctr"/>
+              <a:r>
+                <a:rPr lang="en-US" sz="1050" dirty="0"/>
+                <a:t>27</a:t>
+              </a:r>
+              <a:endParaRPr lang="en-ID" sz="1050" dirty="0"/>
+            </a:p>
+          </p:txBody>
+        </p:sp>
+      </p:grpSp>
+      <p:grpSp>
+        <p:nvGrpSpPr>
+          <p:cNvPr id="120" name="Group 119">
+            <a:extLst>
+              <a:ext uri="{FF2B5EF4-FFF2-40B4-BE49-F238E27FC236}">
+                <a16:creationId xmlns:a16="http://schemas.microsoft.com/office/drawing/2014/main" id="{0B0C6E71-CF17-4CB0-A85E-4EC1BB9CD646}"/>
+              </a:ext>
+            </a:extLst>
+          </p:cNvPr>
+          <p:cNvGrpSpPr/>
+          <p:nvPr/>
+        </p:nvGrpSpPr>
+        <p:grpSpPr>
+          <a:xfrm>
+            <a:off x="5266450" y="3863007"/>
+            <a:ext cx="1391920" cy="1697217"/>
+            <a:chOff x="1137920" y="1228367"/>
+            <a:chExt cx="2204720" cy="2835633"/>
+          </a:xfrm>
+        </p:grpSpPr>
+        <p:sp>
+          <p:nvSpPr>
+            <p:cNvPr id="121" name="Rectangle 120">
+              <a:extLst>
+                <a:ext uri="{FF2B5EF4-FFF2-40B4-BE49-F238E27FC236}">
+                  <a16:creationId xmlns:a16="http://schemas.microsoft.com/office/drawing/2014/main" id="{75561F60-E7E9-45CE-89FE-13FCB938CD70}"/>
+                </a:ext>
+              </a:extLst>
+            </p:cNvPr>
+            <p:cNvSpPr/>
+            <p:nvPr/>
+          </p:nvSpPr>
+          <p:spPr>
+            <a:xfrm>
+              <a:off x="1137920" y="1229360"/>
+              <a:ext cx="2204720" cy="2834640"/>
+            </a:xfrm>
+            <a:prstGeom prst="rect">
+              <a:avLst/>
+            </a:prstGeom>
+          </p:spPr>
+          <p:style>
+            <a:lnRef idx="2">
+              <a:schemeClr val="accent1">
+                <a:shade val="50000"/>
+              </a:schemeClr>
+            </a:lnRef>
+            <a:fillRef idx="1">
+              <a:schemeClr val="accent1"/>
+            </a:fillRef>
+            <a:effectRef idx="0">
+              <a:schemeClr val="accent1"/>
+            </a:effectRef>
+            <a:fontRef idx="minor">
+              <a:schemeClr val="lt1"/>
+            </a:fontRef>
+          </p:style>
+          <p:txBody>
+            <a:bodyPr rtlCol="0" anchor="ctr"/>
+            <a:lstStyle/>
+            <a:p>
+              <a:pPr algn="ctr"/>
+              <a:endParaRPr lang="en-ID" sz="1050" dirty="0"/>
+            </a:p>
+          </p:txBody>
+        </p:sp>
+        <p:pic>
+          <p:nvPicPr>
+            <p:cNvPr id="122" name="Picture 121">
+              <a:extLst>
+                <a:ext uri="{FF2B5EF4-FFF2-40B4-BE49-F238E27FC236}">
+                  <a16:creationId xmlns:a16="http://schemas.microsoft.com/office/drawing/2014/main" id="{50B1BC49-56DE-43F2-94FB-C448AC8F50F5}"/>
+                </a:ext>
+              </a:extLst>
+            </p:cNvPr>
+            <p:cNvPicPr>
+              <a:picLocks noChangeAspect="1"/>
+            </p:cNvPicPr>
+            <p:nvPr/>
+          </p:nvPicPr>
+          <p:blipFill rotWithShape="1">
+            <a:blip r:embed="rId3">
+              <a:extLst>
+                <a:ext uri="{28A0092B-C50C-407E-A947-70E740481C1C}">
+                  <a14:useLocalDpi xmlns:a14="http://schemas.microsoft.com/office/drawing/2010/main" val="0"/>
+                </a:ext>
+              </a:extLst>
+            </a:blip>
+            <a:srcRect l="18849" r="19461"/>
+            <a:stretch/>
+          </p:blipFill>
+          <p:spPr>
+            <a:xfrm>
+              <a:off x="1371600" y="1596706"/>
+              <a:ext cx="1778000" cy="1719489"/>
+            </a:xfrm>
+            <a:prstGeom prst="rect">
+              <a:avLst/>
+            </a:prstGeom>
+          </p:spPr>
+        </p:pic>
+        <p:sp>
+          <p:nvSpPr>
+            <p:cNvPr id="123" name="TextBox 122">
+              <a:extLst>
+                <a:ext uri="{FF2B5EF4-FFF2-40B4-BE49-F238E27FC236}">
+                  <a16:creationId xmlns:a16="http://schemas.microsoft.com/office/drawing/2014/main" id="{B67CF0CE-5BBD-4F17-BC3A-E0D85CB8E603}"/>
+                </a:ext>
+              </a:extLst>
+            </p:cNvPr>
+            <p:cNvSpPr txBox="1"/>
+            <p:nvPr/>
+          </p:nvSpPr>
+          <p:spPr>
+            <a:xfrm>
+              <a:off x="1809603" y="1228367"/>
+              <a:ext cx="1089766" cy="437086"/>
+            </a:xfrm>
+            <a:prstGeom prst="rect">
+              <a:avLst/>
+            </a:prstGeom>
+            <a:noFill/>
+          </p:spPr>
+          <p:txBody>
+            <a:bodyPr wrap="none" rtlCol="0">
+              <a:spAutoFit/>
+            </a:bodyPr>
+            <a:lstStyle/>
+            <a:p>
+              <a:r>
+                <a:rPr lang="en-US" sz="1050" dirty="0"/>
+                <a:t>Ronaldo </a:t>
+              </a:r>
+              <a:endParaRPr lang="en-ID" sz="1050" dirty="0"/>
+            </a:p>
+          </p:txBody>
+        </p:sp>
+        <p:sp>
+          <p:nvSpPr>
+            <p:cNvPr id="124" name="Rectangle 123">
+              <a:extLst>
+                <a:ext uri="{FF2B5EF4-FFF2-40B4-BE49-F238E27FC236}">
+                  <a16:creationId xmlns:a16="http://schemas.microsoft.com/office/drawing/2014/main" id="{02AB311D-8D05-4EFC-AD18-78191A788834}"/>
+                </a:ext>
+              </a:extLst>
+            </p:cNvPr>
+            <p:cNvSpPr/>
+            <p:nvPr/>
+          </p:nvSpPr>
+          <p:spPr>
+            <a:xfrm>
+              <a:off x="1219200" y="3361880"/>
+              <a:ext cx="863600" cy="292911"/>
+            </a:xfrm>
+            <a:prstGeom prst="rect">
+              <a:avLst/>
+            </a:prstGeom>
+          </p:spPr>
+          <p:style>
+            <a:lnRef idx="2">
+              <a:schemeClr val="accent4">
+                <a:shade val="50000"/>
+              </a:schemeClr>
+            </a:lnRef>
+            <a:fillRef idx="1">
+              <a:schemeClr val="accent4"/>
+            </a:fillRef>
+            <a:effectRef idx="0">
+              <a:schemeClr val="accent4"/>
+            </a:effectRef>
+            <a:fontRef idx="minor">
+              <a:schemeClr val="lt1"/>
+            </a:fontRef>
+          </p:style>
+          <p:txBody>
+            <a:bodyPr rtlCol="0" anchor="ctr"/>
+            <a:lstStyle/>
+            <a:p>
+              <a:pPr algn="ctr"/>
+              <a:r>
+                <a:rPr lang="en-US" sz="1050" dirty="0"/>
+                <a:t>Post</a:t>
+              </a:r>
+              <a:endParaRPr lang="en-ID" sz="1050" dirty="0"/>
+            </a:p>
+          </p:txBody>
+        </p:sp>
+        <p:sp>
+          <p:nvSpPr>
+            <p:cNvPr id="125" name="Rectangle 124">
+              <a:extLst>
+                <a:ext uri="{FF2B5EF4-FFF2-40B4-BE49-F238E27FC236}">
+                  <a16:creationId xmlns:a16="http://schemas.microsoft.com/office/drawing/2014/main" id="{724445CD-DC92-4FA8-B112-D28736EE0515}"/>
+                </a:ext>
+              </a:extLst>
+            </p:cNvPr>
+            <p:cNvSpPr/>
+            <p:nvPr/>
+          </p:nvSpPr>
+          <p:spPr>
+            <a:xfrm>
+              <a:off x="1219200" y="3712940"/>
+              <a:ext cx="863600" cy="292911"/>
+            </a:xfrm>
+            <a:prstGeom prst="rect">
+              <a:avLst/>
+            </a:prstGeom>
+          </p:spPr>
+          <p:style>
+            <a:lnRef idx="2">
+              <a:schemeClr val="accent4">
+                <a:shade val="50000"/>
+              </a:schemeClr>
+            </a:lnRef>
+            <a:fillRef idx="1">
+              <a:schemeClr val="accent4"/>
+            </a:fillRef>
+            <a:effectRef idx="0">
+              <a:schemeClr val="accent4"/>
+            </a:effectRef>
+            <a:fontRef idx="minor">
+              <a:schemeClr val="lt1"/>
+            </a:fontRef>
+          </p:style>
+          <p:txBody>
+            <a:bodyPr rtlCol="0" anchor="ctr"/>
+            <a:lstStyle/>
+            <a:p>
+              <a:pPr algn="ctr"/>
+              <a:r>
+                <a:rPr lang="en-US" sz="1050" dirty="0"/>
+                <a:t>Age</a:t>
+              </a:r>
+              <a:endParaRPr lang="en-ID" sz="1050" dirty="0"/>
+            </a:p>
+          </p:txBody>
+        </p:sp>
+        <p:sp>
+          <p:nvSpPr>
+            <p:cNvPr id="126" name="Rectangle 125">
+              <a:extLst>
+                <a:ext uri="{FF2B5EF4-FFF2-40B4-BE49-F238E27FC236}">
+                  <a16:creationId xmlns:a16="http://schemas.microsoft.com/office/drawing/2014/main" id="{169E4D21-C8D1-43DA-8DB8-E7E42EE24537}"/>
+                </a:ext>
+              </a:extLst>
+            </p:cNvPr>
+            <p:cNvSpPr/>
+            <p:nvPr/>
+          </p:nvSpPr>
+          <p:spPr>
+            <a:xfrm>
+              <a:off x="2207260" y="3361880"/>
+              <a:ext cx="1028700" cy="315430"/>
+            </a:xfrm>
+            <a:prstGeom prst="rect">
+              <a:avLst/>
+            </a:prstGeom>
+          </p:spPr>
+          <p:style>
+            <a:lnRef idx="2">
+              <a:schemeClr val="accent4">
+                <a:shade val="50000"/>
+              </a:schemeClr>
+            </a:lnRef>
+            <a:fillRef idx="1">
+              <a:schemeClr val="accent4"/>
+            </a:fillRef>
+            <a:effectRef idx="0">
+              <a:schemeClr val="accent4"/>
+            </a:effectRef>
+            <a:fontRef idx="minor">
+              <a:schemeClr val="lt1"/>
+            </a:fontRef>
+          </p:style>
+          <p:txBody>
+            <a:bodyPr rtlCol="0" anchor="ctr"/>
+            <a:lstStyle/>
+            <a:p>
+              <a:pPr algn="ctr"/>
+              <a:r>
+                <a:rPr lang="en-US" sz="1050" dirty="0"/>
+                <a:t>DMF/LF</a:t>
+              </a:r>
+              <a:endParaRPr lang="en-ID" sz="1050" dirty="0"/>
+            </a:p>
+          </p:txBody>
+        </p:sp>
+        <p:sp>
+          <p:nvSpPr>
+            <p:cNvPr id="127" name="Rectangle 126">
+              <a:extLst>
+                <a:ext uri="{FF2B5EF4-FFF2-40B4-BE49-F238E27FC236}">
+                  <a16:creationId xmlns:a16="http://schemas.microsoft.com/office/drawing/2014/main" id="{5FC644BD-5CB1-4E87-A4DA-817B20426C60}"/>
                 </a:ext>
               </a:extLst>
             </p:cNvPr>
@@ -8758,42 +9268,6 @@
           </a:graphicData>
         </a:graphic>
       </p:graphicFrame>
-      <p:pic>
-        <p:nvPicPr>
-          <p:cNvPr id="65" name="Picture 64">
-            <a:extLst>
-              <a:ext uri="{FF2B5EF4-FFF2-40B4-BE49-F238E27FC236}">
-                <a16:creationId xmlns:a16="http://schemas.microsoft.com/office/drawing/2014/main" id="{2383E5F2-4DE4-44C8-9252-0D90FAB73301}"/>
-              </a:ext>
-            </a:extLst>
-          </p:cNvPr>
-          <p:cNvPicPr>
-            <a:picLocks noChangeAspect="1"/>
-          </p:cNvPicPr>
-          <p:nvPr/>
-        </p:nvPicPr>
-        <p:blipFill>
-          <a:blip r:embed="rId3">
-            <a:extLst>
-              <a:ext uri="{28A0092B-C50C-407E-A947-70E740481C1C}">
-                <a14:useLocalDpi xmlns:a14="http://schemas.microsoft.com/office/drawing/2010/main" val="0"/>
-              </a:ext>
-            </a:extLst>
-          </a:blip>
-          <a:stretch>
-            <a:fillRect/>
-          </a:stretch>
-        </p:blipFill>
-        <p:spPr>
-          <a:xfrm flipH="1">
-            <a:off x="10492844" y="1449148"/>
-            <a:ext cx="2623838" cy="5995394"/>
-          </a:xfrm>
-          <a:prstGeom prst="rect">
-            <a:avLst/>
-          </a:prstGeom>
-        </p:spPr>
-      </p:pic>
       <p:sp>
         <p:nvSpPr>
           <p:cNvPr id="66" name="Rectangle 65">
@@ -8868,7 +9342,7 @@
           <p:nvPr/>
         </p:nvPicPr>
         <p:blipFill>
-          <a:blip r:embed="rId4">
+          <a:blip r:embed="rId3">
             <a:extLst>
               <a:ext uri="{28A0092B-C50C-407E-A947-70E740481C1C}">
                 <a14:useLocalDpi xmlns:a14="http://schemas.microsoft.com/office/drawing/2010/main" val="0"/>
@@ -9174,7 +9648,7 @@
             <p:nvPr/>
           </p:nvPicPr>
           <p:blipFill rotWithShape="1">
-            <a:blip r:embed="rId5">
+            <a:blip r:embed="rId4">
               <a:extLst>
                 <a:ext uri="{28A0092B-C50C-407E-A947-70E740481C1C}">
                   <a14:useLocalDpi xmlns:a14="http://schemas.microsoft.com/office/drawing/2010/main" val="0"/>
@@ -9512,7 +9986,7 @@
             <p:nvPr/>
           </p:nvPicPr>
           <p:blipFill rotWithShape="1">
-            <a:blip r:embed="rId5">
+            <a:blip r:embed="rId4">
               <a:extLst>
                 <a:ext uri="{28A0092B-C50C-407E-A947-70E740481C1C}">
                   <a14:useLocalDpi xmlns:a14="http://schemas.microsoft.com/office/drawing/2010/main" val="0"/>
@@ -9850,7 +10324,7 @@
             <p:nvPr/>
           </p:nvPicPr>
           <p:blipFill rotWithShape="1">
-            <a:blip r:embed="rId5">
+            <a:blip r:embed="rId4">
               <a:extLst>
                 <a:ext uri="{28A0092B-C50C-407E-A947-70E740481C1C}">
                   <a14:useLocalDpi xmlns:a14="http://schemas.microsoft.com/office/drawing/2010/main" val="0"/>
@@ -10372,7 +10846,7 @@
             <p:nvPr/>
           </p:nvPicPr>
           <p:blipFill rotWithShape="1">
-            <a:blip r:embed="rId5">
+            <a:blip r:embed="rId4">
               <a:extLst>
                 <a:ext uri="{28A0092B-C50C-407E-A947-70E740481C1C}">
                   <a14:useLocalDpi xmlns:a14="http://schemas.microsoft.com/office/drawing/2010/main" val="0"/>
@@ -10710,7 +11184,7 @@
             <p:nvPr/>
           </p:nvPicPr>
           <p:blipFill rotWithShape="1">
-            <a:blip r:embed="rId5">
+            <a:blip r:embed="rId4">
               <a:extLst>
                 <a:ext uri="{28A0092B-C50C-407E-A947-70E740481C1C}">
                   <a14:useLocalDpi xmlns:a14="http://schemas.microsoft.com/office/drawing/2010/main" val="0"/>
@@ -11048,7 +11522,7 @@
             <p:nvPr/>
           </p:nvPicPr>
           <p:blipFill rotWithShape="1">
-            <a:blip r:embed="rId5">
+            <a:blip r:embed="rId4">
               <a:extLst>
                 <a:ext uri="{28A0092B-C50C-407E-A947-70E740481C1C}">
                   <a14:useLocalDpi xmlns:a14="http://schemas.microsoft.com/office/drawing/2010/main" val="0"/>
@@ -11386,7 +11860,7 @@
             <p:nvPr/>
           </p:nvPicPr>
           <p:blipFill rotWithShape="1">
-            <a:blip r:embed="rId5">
+            <a:blip r:embed="rId4">
               <a:extLst>
                 <a:ext uri="{28A0092B-C50C-407E-A947-70E740481C1C}">
                   <a14:useLocalDpi xmlns:a14="http://schemas.microsoft.com/office/drawing/2010/main" val="0"/>
@@ -11724,7 +12198,7 @@
             <p:nvPr/>
           </p:nvPicPr>
           <p:blipFill rotWithShape="1">
-            <a:blip r:embed="rId5">
+            <a:blip r:embed="rId4">
               <a:extLst>
                 <a:ext uri="{28A0092B-C50C-407E-A947-70E740481C1C}">
                   <a14:useLocalDpi xmlns:a14="http://schemas.microsoft.com/office/drawing/2010/main" val="0"/>
@@ -11981,6 +12455,225 @@
           </p:txBody>
         </p:sp>
       </p:grpSp>
+      <p:cxnSp>
+        <p:nvCxnSpPr>
+          <p:cNvPr id="138" name="Straight Connector 137">
+            <a:extLst>
+              <a:ext uri="{FF2B5EF4-FFF2-40B4-BE49-F238E27FC236}">
+                <a16:creationId xmlns:a16="http://schemas.microsoft.com/office/drawing/2014/main" id="{4F06A232-D972-44B2-B4CF-56737693AC49}"/>
+              </a:ext>
+            </a:extLst>
+          </p:cNvPr>
+          <p:cNvCxnSpPr>
+            <a:cxnSpLocks/>
+          </p:cNvCxnSpPr>
+          <p:nvPr/>
+        </p:nvCxnSpPr>
+        <p:spPr>
+          <a:xfrm>
+            <a:off x="10948280" y="1599542"/>
+            <a:ext cx="0" cy="1862912"/>
+          </a:xfrm>
+          <a:prstGeom prst="line">
+            <a:avLst/>
+          </a:prstGeom>
+          <a:ln w="19050">
+            <a:solidFill>
+              <a:schemeClr val="bg1"/>
+            </a:solidFill>
+          </a:ln>
+        </p:spPr>
+        <p:style>
+          <a:lnRef idx="1">
+            <a:schemeClr val="accent1"/>
+          </a:lnRef>
+          <a:fillRef idx="0">
+            <a:schemeClr val="accent1"/>
+          </a:fillRef>
+          <a:effectRef idx="0">
+            <a:schemeClr val="accent1"/>
+          </a:effectRef>
+          <a:fontRef idx="minor">
+            <a:schemeClr val="tx1"/>
+          </a:fontRef>
+        </p:style>
+      </p:cxnSp>
+      <p:sp>
+        <p:nvSpPr>
+          <p:cNvPr id="139" name="TextBox 138">
+            <a:extLst>
+              <a:ext uri="{FF2B5EF4-FFF2-40B4-BE49-F238E27FC236}">
+                <a16:creationId xmlns:a16="http://schemas.microsoft.com/office/drawing/2014/main" id="{F6A9D946-82B6-42B7-9023-D5B387F1D609}"/>
+              </a:ext>
+            </a:extLst>
+          </p:cNvPr>
+          <p:cNvSpPr txBox="1"/>
+          <p:nvPr/>
+        </p:nvSpPr>
+        <p:spPr>
+          <a:xfrm>
+            <a:off x="11037095" y="1531310"/>
+            <a:ext cx="344966" cy="461665"/>
+          </a:xfrm>
+          <a:prstGeom prst="rect">
+            <a:avLst/>
+          </a:prstGeom>
+          <a:noFill/>
+        </p:spPr>
+        <p:txBody>
+          <a:bodyPr wrap="none" rtlCol="0">
+            <a:spAutoFit/>
+          </a:bodyPr>
+          <a:lstStyle/>
+          <a:p>
+            <a:r>
+              <a:rPr lang="en-US" sz="2400" dirty="0">
+                <a:solidFill>
+                  <a:srgbClr val="FF0000"/>
+                </a:solidFill>
+              </a:rPr>
+              <a:t>X</a:t>
+            </a:r>
+            <a:endParaRPr lang="en-ID" sz="2400" dirty="0">
+              <a:solidFill>
+                <a:srgbClr val="FF0000"/>
+              </a:solidFill>
+            </a:endParaRPr>
+          </a:p>
+        </p:txBody>
+      </p:sp>
+      <p:sp>
+        <p:nvSpPr>
+          <p:cNvPr id="140" name="TextBox 139">
+            <a:extLst>
+              <a:ext uri="{FF2B5EF4-FFF2-40B4-BE49-F238E27FC236}">
+                <a16:creationId xmlns:a16="http://schemas.microsoft.com/office/drawing/2014/main" id="{98C1A736-954E-435D-BF81-4A5E5599904F}"/>
+              </a:ext>
+            </a:extLst>
+          </p:cNvPr>
+          <p:cNvSpPr txBox="1"/>
+          <p:nvPr/>
+        </p:nvSpPr>
+        <p:spPr>
+          <a:xfrm>
+            <a:off x="11034221" y="1899361"/>
+            <a:ext cx="344966" cy="461665"/>
+          </a:xfrm>
+          <a:prstGeom prst="rect">
+            <a:avLst/>
+          </a:prstGeom>
+          <a:noFill/>
+        </p:spPr>
+        <p:txBody>
+          <a:bodyPr wrap="square" rtlCol="0">
+            <a:spAutoFit/>
+          </a:bodyPr>
+          <a:lstStyle/>
+          <a:p>
+            <a:r>
+              <a:rPr lang="en-US" sz="2400" dirty="0">
+                <a:solidFill>
+                  <a:srgbClr val="FF0000"/>
+                </a:solidFill>
+              </a:rPr>
+              <a:t>X</a:t>
+            </a:r>
+            <a:endParaRPr lang="en-ID" sz="2400" dirty="0">
+              <a:solidFill>
+                <a:srgbClr val="FF0000"/>
+              </a:solidFill>
+            </a:endParaRPr>
+          </a:p>
+        </p:txBody>
+      </p:sp>
+      <p:sp>
+        <p:nvSpPr>
+          <p:cNvPr id="141" name="TextBox 140">
+            <a:extLst>
+              <a:ext uri="{FF2B5EF4-FFF2-40B4-BE49-F238E27FC236}">
+                <a16:creationId xmlns:a16="http://schemas.microsoft.com/office/drawing/2014/main" id="{903A96E4-E604-4AB1-86B9-749298EDF296}"/>
+              </a:ext>
+            </a:extLst>
+          </p:cNvPr>
+          <p:cNvSpPr txBox="1"/>
+          <p:nvPr/>
+        </p:nvSpPr>
+        <p:spPr>
+          <a:xfrm>
+            <a:off x="11038777" y="2278385"/>
+            <a:ext cx="344966" cy="461665"/>
+          </a:xfrm>
+          <a:prstGeom prst="rect">
+            <a:avLst/>
+          </a:prstGeom>
+          <a:noFill/>
+        </p:spPr>
+        <p:txBody>
+          <a:bodyPr wrap="none" rtlCol="0">
+            <a:spAutoFit/>
+          </a:bodyPr>
+          <a:lstStyle/>
+          <a:p>
+            <a:r>
+              <a:rPr lang="en-US" sz="2400" dirty="0">
+                <a:solidFill>
+                  <a:srgbClr val="FF0000"/>
+                </a:solidFill>
+              </a:rPr>
+              <a:t>X</a:t>
+            </a:r>
+            <a:endParaRPr lang="en-ID" sz="2400" dirty="0">
+              <a:solidFill>
+                <a:srgbClr val="FF0000"/>
+              </a:solidFill>
+            </a:endParaRPr>
+          </a:p>
+        </p:txBody>
+      </p:sp>
+      <p:sp>
+        <p:nvSpPr>
+          <p:cNvPr id="142" name="TextBox 141">
+            <a:extLst>
+              <a:ext uri="{FF2B5EF4-FFF2-40B4-BE49-F238E27FC236}">
+                <a16:creationId xmlns:a16="http://schemas.microsoft.com/office/drawing/2014/main" id="{5831EE0F-A9A4-473F-83C1-1916C2D41A92}"/>
+              </a:ext>
+            </a:extLst>
+          </p:cNvPr>
+          <p:cNvSpPr txBox="1"/>
+          <p:nvPr/>
+        </p:nvSpPr>
+        <p:spPr>
+          <a:xfrm>
+            <a:off x="11035903" y="2663688"/>
+            <a:ext cx="344966" cy="461665"/>
+          </a:xfrm>
+          <a:prstGeom prst="rect">
+            <a:avLst/>
+          </a:prstGeom>
+          <a:noFill/>
+        </p:spPr>
+        <p:txBody>
+          <a:bodyPr wrap="square" rtlCol="0">
+            <a:spAutoFit/>
+          </a:bodyPr>
+          <a:lstStyle/>
+          <a:p>
+            <a:r>
+              <a:rPr lang="en-US" sz="2400" dirty="0">
+                <a:solidFill>
+                  <a:srgbClr val="FF0000"/>
+                </a:solidFill>
+              </a:rPr>
+              <a:t>X</a:t>
+            </a:r>
+            <a:endParaRPr lang="en-ID" sz="2400" dirty="0">
+              <a:solidFill>
+                <a:srgbClr val="FF0000"/>
+              </a:solidFill>
+            </a:endParaRPr>
+          </a:p>
+        </p:txBody>
+      </p:sp>
     </p:spTree>
     <p:extLst>
       <p:ext uri="{BB962C8B-B14F-4D97-AF65-F5344CB8AC3E}">

</xml_diff>